<commit_message>
Instructions and ReadME update
Added instructions word doc and updated ReadME file to change
formatting and added new steps.
</commit_message>
<xml_diff>
--- a/Intro-Lab2.pptx
+++ b/Intro-Lab2.pptx
@@ -5800,20 +5800,12 @@
           <a:lstStyle/>
           <a:p>
             <a:r>
-              <a:rPr lang="en-US" sz="1100" b="1" dirty="0" err="1" smtClean="0">
+              <a:rPr lang="en-US" sz="1100" b="1" dirty="0" smtClean="0">
                 <a:solidFill>
                   <a:schemeClr val="accent4"/>
                 </a:solidFill>
               </a:rPr>
-              <a:t>Bluemix</a:t>
-            </a:r>
-            <a:r>
-              <a:rPr lang="en-US" sz="1100" b="1" dirty="0" smtClean="0">
-                <a:solidFill>
-                  <a:schemeClr val="accent4"/>
-                </a:solidFill>
-              </a:rPr>
-              <a:t> Services</a:t>
+              <a:t>Bluemix Services</a:t>
             </a:r>
             <a:endParaRPr lang="en-US" sz="1100" b="1" dirty="0">
               <a:solidFill>

</xml_diff>